<commit_message>
minor changes on figure
</commit_message>
<xml_diff>
--- a/figures/resources/filter_morphological.pptx
+++ b/figures/resources/filter_morphological.pptx
@@ -104,6 +104,11 @@
       </a:defRPr>
     </a:lvl9pPr>
   </p:defaultTextStyle>
+  <p:extLst>
+    <p:ext uri="{EFAFB233-063F-42B5-8137-9DF3F51BA10A}">
+      <p15:sldGuideLst xmlns:p15="http://schemas.microsoft.com/office/powerpoint/2012/main"/>
+    </p:ext>
+  </p:extLst>
 </p:presentation>
 </file>
 
@@ -2986,8 +2991,8 @@
         </p:blipFill>
         <p:spPr>
           <a:xfrm>
-            <a:off x="856487" y="733687"/>
-            <a:ext cx="2913890" cy="2913890"/>
+            <a:off x="268224" y="340496"/>
+            <a:ext cx="3700272" cy="3700272"/>
           </a:xfrm>
           <a:prstGeom prst="rect">
             <a:avLst/>
@@ -3016,8 +3021,8 @@
         </p:blipFill>
         <p:spPr>
           <a:xfrm>
-            <a:off x="856487" y="3380231"/>
-            <a:ext cx="2913890" cy="2913890"/>
+            <a:off x="268224" y="2987040"/>
+            <a:ext cx="3700272" cy="3700272"/>
           </a:xfrm>
           <a:prstGeom prst="rect">
             <a:avLst/>
@@ -3032,8 +3037,8 @@
         </p:nvSpPr>
         <p:spPr>
           <a:xfrm>
-            <a:off x="765598" y="3443358"/>
-            <a:ext cx="2724734" cy="646331"/>
+            <a:off x="202858" y="3356145"/>
+            <a:ext cx="4002403" cy="369332"/>
           </a:xfrm>
           <a:prstGeom prst="rect">
             <a:avLst/>
@@ -3074,8 +3079,8 @@
         </p:nvSpPr>
         <p:spPr>
           <a:xfrm>
-            <a:off x="765598" y="852634"/>
-            <a:ext cx="2746494" cy="646331"/>
+            <a:off x="199922" y="765421"/>
+            <a:ext cx="4256254" cy="369332"/>
           </a:xfrm>
           <a:prstGeom prst="rect">
             <a:avLst/>
@@ -3396,8 +3401,8 @@
         </p:nvSpPr>
         <p:spPr>
           <a:xfrm rot="16200000">
-            <a:off x="8339791" y="-2909930"/>
-            <a:ext cx="129726" cy="6994746"/>
+            <a:off x="8053276" y="-2623416"/>
+            <a:ext cx="129727" cy="6421717"/>
           </a:xfrm>
           <a:prstGeom prst="rightBrace">
             <a:avLst>
@@ -3442,7 +3447,7 @@
         </p:nvSpPr>
         <p:spPr>
           <a:xfrm>
-            <a:off x="7968755" y="153247"/>
+            <a:off x="7704595" y="153247"/>
             <a:ext cx="856325" cy="369332"/>
           </a:xfrm>
           <a:prstGeom prst="rect">
@@ -3472,7 +3477,7 @@
         </p:nvSpPr>
         <p:spPr>
           <a:xfrm>
-            <a:off x="7845325" y="6523072"/>
+            <a:off x="7579493" y="6410947"/>
             <a:ext cx="979755" cy="369332"/>
           </a:xfrm>
           <a:prstGeom prst="rect">
@@ -3502,8 +3507,8 @@
         </p:nvSpPr>
         <p:spPr>
           <a:xfrm rot="5400000" flipV="1">
-            <a:off x="8242255" y="2993091"/>
-            <a:ext cx="129726" cy="6994746"/>
+            <a:off x="8020636" y="3082630"/>
+            <a:ext cx="97471" cy="6519253"/>
           </a:xfrm>
           <a:prstGeom prst="rightBrace">
             <a:avLst>

</xml_diff>